<commit_message>
removed all the animations in the slides.
</commit_message>
<xml_diff>
--- a/src/main/resources/final_CA_slides.pptx
+++ b/src/main/resources/final_CA_slides.pptx
@@ -4535,6 +4535,13 @@
   <p:clrMapOvr>
     <a:masterClrMapping/>
   </p:clrMapOvr>
+  <p:timing>
+    <p:tnLst>
+      <p:par>
+        <p:cTn id="1" dur="indefinite" restart="never" nodeType="tmRoot"/>
+      </p:par>
+    </p:tnLst>
+  </p:timing>
 </p:sld>
 </file>
 
@@ -4835,6 +4842,13 @@
   <p:clrMapOvr>
     <a:masterClrMapping/>
   </p:clrMapOvr>
+  <p:timing>
+    <p:tnLst>
+      <p:par>
+        <p:cTn id="1" dur="indefinite" restart="never" nodeType="tmRoot"/>
+      </p:par>
+    </p:tnLst>
+  </p:timing>
 </p:sld>
 </file>
 
@@ -4893,6 +4907,13 @@
   <p:clrMapOvr>
     <a:masterClrMapping/>
   </p:clrMapOvr>
+  <p:timing>
+    <p:tnLst>
+      <p:par>
+        <p:cTn id="1" dur="indefinite" restart="never" nodeType="tmRoot"/>
+      </p:par>
+    </p:tnLst>
+  </p:timing>
 </p:sld>
 </file>
 
@@ -4984,6 +5005,13 @@
   <p:clrMapOvr>
     <a:masterClrMapping/>
   </p:clrMapOvr>
+  <p:timing>
+    <p:tnLst>
+      <p:par>
+        <p:cTn id="1" dur="indefinite" restart="never" nodeType="tmRoot"/>
+      </p:par>
+    </p:tnLst>
+  </p:timing>
 </p:sld>
 </file>
 
@@ -5075,6 +5103,13 @@
   <p:clrMapOvr>
     <a:masterClrMapping/>
   </p:clrMapOvr>
+  <p:timing>
+    <p:tnLst>
+      <p:par>
+        <p:cTn id="1" dur="indefinite" restart="never" nodeType="tmRoot"/>
+      </p:par>
+    </p:tnLst>
+  </p:timing>
 </p:sld>
 </file>
 
@@ -5249,11 +5284,7 @@
             </a:r>
             <a:r>
               <a:rPr lang="en-US" altLang="zh-CN" dirty="0" smtClean="0"/>
-              <a:t>-</a:t>
-            </a:r>
-            <a:r>
-              <a:rPr lang="en-US" altLang="zh-CN" dirty="0" smtClean="0"/>
-              <a:t>&gt;</a:t>
+              <a:t>-&gt;</a:t>
             </a:r>
             <a:r>
               <a:rPr lang="zh-CN" altLang="en-US" dirty="0" smtClean="0"/>
@@ -5918,182 +5949,9 @@
   <p:timing>
     <p:tnLst>
       <p:par>
-        <p:cTn id="1" dur="indefinite" restart="never" nodeType="tmRoot">
-          <p:childTnLst>
-            <p:seq concurrent="1" nextAc="seek">
-              <p:cTn id="2" dur="indefinite" nodeType="mainSeq">
-                <p:childTnLst>
-                  <p:par>
-                    <p:cTn id="3" fill="hold">
-                      <p:stCondLst>
-                        <p:cond delay="indefinite"/>
-                      </p:stCondLst>
-                      <p:childTnLst>
-                        <p:par>
-                          <p:cTn id="4" fill="hold">
-                            <p:stCondLst>
-                              <p:cond delay="0"/>
-                            </p:stCondLst>
-                            <p:childTnLst>
-                              <p:par>
-                                <p:cTn id="5" presetID="1" presetClass="entr" presetSubtype="0" fill="hold" grpId="0" nodeType="clickEffect">
-                                  <p:stCondLst>
-                                    <p:cond delay="0"/>
-                                  </p:stCondLst>
-                                  <p:childTnLst>
-                                    <p:set>
-                                      <p:cBhvr>
-                                        <p:cTn id="6" dur="1" fill="hold">
-                                          <p:stCondLst>
-                                            <p:cond delay="0"/>
-                                          </p:stCondLst>
-                                        </p:cTn>
-                                        <p:tgtEl>
-                                          <p:spTgt spid="12"/>
-                                        </p:tgtEl>
-                                        <p:attrNameLst>
-                                          <p:attrName>style.visibility</p:attrName>
-                                        </p:attrNameLst>
-                                      </p:cBhvr>
-                                      <p:to>
-                                        <p:strVal val="visible"/>
-                                      </p:to>
-                                    </p:set>
-                                  </p:childTnLst>
-                                </p:cTn>
-                              </p:par>
-                              <p:par>
-                                <p:cTn id="7" presetID="1" presetClass="entr" presetSubtype="0" fill="hold" grpId="0" nodeType="withEffect">
-                                  <p:stCondLst>
-                                    <p:cond delay="0"/>
-                                  </p:stCondLst>
-                                  <p:childTnLst>
-                                    <p:set>
-                                      <p:cBhvr>
-                                        <p:cTn id="8" dur="1" fill="hold">
-                                          <p:stCondLst>
-                                            <p:cond delay="0"/>
-                                          </p:stCondLst>
-                                        </p:cTn>
-                                        <p:tgtEl>
-                                          <p:spTgt spid="19"/>
-                                        </p:tgtEl>
-                                        <p:attrNameLst>
-                                          <p:attrName>style.visibility</p:attrName>
-                                        </p:attrNameLst>
-                                      </p:cBhvr>
-                                      <p:to>
-                                        <p:strVal val="visible"/>
-                                      </p:to>
-                                    </p:set>
-                                  </p:childTnLst>
-                                </p:cTn>
-                              </p:par>
-                            </p:childTnLst>
-                          </p:cTn>
-                        </p:par>
-                      </p:childTnLst>
-                    </p:cTn>
-                  </p:par>
-                  <p:par>
-                    <p:cTn id="9" fill="hold">
-                      <p:stCondLst>
-                        <p:cond delay="indefinite"/>
-                      </p:stCondLst>
-                      <p:childTnLst>
-                        <p:par>
-                          <p:cTn id="10" fill="hold">
-                            <p:stCondLst>
-                              <p:cond delay="0"/>
-                            </p:stCondLst>
-                            <p:childTnLst>
-                              <p:par>
-                                <p:cTn id="11" presetID="1" presetClass="entr" presetSubtype="0" fill="hold" grpId="0" nodeType="clickEffect">
-                                  <p:stCondLst>
-                                    <p:cond delay="0"/>
-                                  </p:stCondLst>
-                                  <p:childTnLst>
-                                    <p:set>
-                                      <p:cBhvr>
-                                        <p:cTn id="12" dur="1" fill="hold">
-                                          <p:stCondLst>
-                                            <p:cond delay="0"/>
-                                          </p:stCondLst>
-                                        </p:cTn>
-                                        <p:tgtEl>
-                                          <p:spTgt spid="11"/>
-                                        </p:tgtEl>
-                                        <p:attrNameLst>
-                                          <p:attrName>style.visibility</p:attrName>
-                                        </p:attrNameLst>
-                                      </p:cBhvr>
-                                      <p:to>
-                                        <p:strVal val="visible"/>
-                                      </p:to>
-                                    </p:set>
-                                  </p:childTnLst>
-                                </p:cTn>
-                              </p:par>
-                              <p:par>
-                                <p:cTn id="13" presetID="1" presetClass="entr" presetSubtype="0" fill="hold" grpId="0" nodeType="withEffect">
-                                  <p:stCondLst>
-                                    <p:cond delay="0"/>
-                                  </p:stCondLst>
-                                  <p:childTnLst>
-                                    <p:set>
-                                      <p:cBhvr>
-                                        <p:cTn id="14" dur="1" fill="hold">
-                                          <p:stCondLst>
-                                            <p:cond delay="0"/>
-                                          </p:stCondLst>
-                                        </p:cTn>
-                                        <p:tgtEl>
-                                          <p:spTgt spid="23"/>
-                                        </p:tgtEl>
-                                        <p:attrNameLst>
-                                          <p:attrName>style.visibility</p:attrName>
-                                        </p:attrNameLst>
-                                      </p:cBhvr>
-                                      <p:to>
-                                        <p:strVal val="visible"/>
-                                      </p:to>
-                                    </p:set>
-                                  </p:childTnLst>
-                                </p:cTn>
-                              </p:par>
-                            </p:childTnLst>
-                          </p:cTn>
-                        </p:par>
-                      </p:childTnLst>
-                    </p:cTn>
-                  </p:par>
-                </p:childTnLst>
-              </p:cTn>
-              <p:prevCondLst>
-                <p:cond evt="onPrev" delay="0">
-                  <p:tgtEl>
-                    <p:sldTgt/>
-                  </p:tgtEl>
-                </p:cond>
-              </p:prevCondLst>
-              <p:nextCondLst>
-                <p:cond evt="onNext" delay="0">
-                  <p:tgtEl>
-                    <p:sldTgt/>
-                  </p:tgtEl>
-                </p:cond>
-              </p:nextCondLst>
-            </p:seq>
-          </p:childTnLst>
-        </p:cTn>
+        <p:cTn id="1" dur="indefinite" restart="never" nodeType="tmRoot"/>
       </p:par>
     </p:tnLst>
-    <p:bldLst>
-      <p:bldP spid="11" grpId="0" animBg="1"/>
-      <p:bldP spid="12" grpId="0" animBg="1"/>
-      <p:bldP spid="19" grpId="0" animBg="1"/>
-      <p:bldP spid="23" grpId="0" animBg="1"/>
-    </p:bldLst>
   </p:timing>
 </p:sld>
 </file>
@@ -6382,7 +6240,6 @@
               <a:rPr lang="en-US" altLang="zh-CN" dirty="0" smtClean="0"/>
               <a:t>room</a:t>
             </a:r>
-            <a:endParaRPr lang="en-US" altLang="zh-CN" dirty="0" smtClean="0"/>
           </a:p>
         </p:txBody>
       </p:sp>
@@ -6887,228 +6744,9 @@
   <p:timing>
     <p:tnLst>
       <p:par>
-        <p:cTn id="1" dur="indefinite" restart="never" nodeType="tmRoot">
-          <p:childTnLst>
-            <p:seq concurrent="1" nextAc="seek">
-              <p:cTn id="2" dur="indefinite" nodeType="mainSeq">
-                <p:childTnLst>
-                  <p:par>
-                    <p:cTn id="3" fill="hold">
-                      <p:stCondLst>
-                        <p:cond delay="indefinite"/>
-                      </p:stCondLst>
-                      <p:childTnLst>
-                        <p:par>
-                          <p:cTn id="4" fill="hold">
-                            <p:stCondLst>
-                              <p:cond delay="0"/>
-                            </p:stCondLst>
-                            <p:childTnLst>
-                              <p:par>
-                                <p:cTn id="5" presetID="1" presetClass="entr" presetSubtype="0" fill="hold" grpId="0" nodeType="clickEffect">
-                                  <p:stCondLst>
-                                    <p:cond delay="0"/>
-                                  </p:stCondLst>
-                                  <p:childTnLst>
-                                    <p:set>
-                                      <p:cBhvr>
-                                        <p:cTn id="6" dur="1" fill="hold">
-                                          <p:stCondLst>
-                                            <p:cond delay="0"/>
-                                          </p:stCondLst>
-                                        </p:cTn>
-                                        <p:tgtEl>
-                                          <p:spTgt spid="9"/>
-                                        </p:tgtEl>
-                                        <p:attrNameLst>
-                                          <p:attrName>style.visibility</p:attrName>
-                                        </p:attrNameLst>
-                                      </p:cBhvr>
-                                      <p:to>
-                                        <p:strVal val="visible"/>
-                                      </p:to>
-                                    </p:set>
-                                  </p:childTnLst>
-                                </p:cTn>
-                              </p:par>
-                              <p:par>
-                                <p:cTn id="7" presetID="1" presetClass="entr" presetSubtype="0" fill="hold" grpId="0" nodeType="withEffect">
-                                  <p:stCondLst>
-                                    <p:cond delay="0"/>
-                                  </p:stCondLst>
-                                  <p:childTnLst>
-                                    <p:set>
-                                      <p:cBhvr>
-                                        <p:cTn id="8" dur="1" fill="hold">
-                                          <p:stCondLst>
-                                            <p:cond delay="0"/>
-                                          </p:stCondLst>
-                                        </p:cTn>
-                                        <p:tgtEl>
-                                          <p:spTgt spid="14"/>
-                                        </p:tgtEl>
-                                        <p:attrNameLst>
-                                          <p:attrName>style.visibility</p:attrName>
-                                        </p:attrNameLst>
-                                      </p:cBhvr>
-                                      <p:to>
-                                        <p:strVal val="visible"/>
-                                      </p:to>
-                                    </p:set>
-                                  </p:childTnLst>
-                                </p:cTn>
-                              </p:par>
-                            </p:childTnLst>
-                          </p:cTn>
-                        </p:par>
-                      </p:childTnLst>
-                    </p:cTn>
-                  </p:par>
-                  <p:par>
-                    <p:cTn id="9" fill="hold">
-                      <p:stCondLst>
-                        <p:cond delay="indefinite"/>
-                      </p:stCondLst>
-                      <p:childTnLst>
-                        <p:par>
-                          <p:cTn id="10" fill="hold">
-                            <p:stCondLst>
-                              <p:cond delay="0"/>
-                            </p:stCondLst>
-                            <p:childTnLst>
-                              <p:par>
-                                <p:cTn id="11" presetID="1" presetClass="entr" presetSubtype="0" fill="hold" grpId="0" nodeType="clickEffect">
-                                  <p:stCondLst>
-                                    <p:cond delay="0"/>
-                                  </p:stCondLst>
-                                  <p:childTnLst>
-                                    <p:set>
-                                      <p:cBhvr>
-                                        <p:cTn id="12" dur="1" fill="hold">
-                                          <p:stCondLst>
-                                            <p:cond delay="0"/>
-                                          </p:stCondLst>
-                                        </p:cTn>
-                                        <p:tgtEl>
-                                          <p:spTgt spid="8"/>
-                                        </p:tgtEl>
-                                        <p:attrNameLst>
-                                          <p:attrName>style.visibility</p:attrName>
-                                        </p:attrNameLst>
-                                      </p:cBhvr>
-                                      <p:to>
-                                        <p:strVal val="visible"/>
-                                      </p:to>
-                                    </p:set>
-                                  </p:childTnLst>
-                                </p:cTn>
-                              </p:par>
-                            </p:childTnLst>
-                          </p:cTn>
-                        </p:par>
-                      </p:childTnLst>
-                    </p:cTn>
-                  </p:par>
-                  <p:par>
-                    <p:cTn id="13" fill="hold">
-                      <p:stCondLst>
-                        <p:cond delay="indefinite"/>
-                      </p:stCondLst>
-                      <p:childTnLst>
-                        <p:par>
-                          <p:cTn id="14" fill="hold">
-                            <p:stCondLst>
-                              <p:cond delay="0"/>
-                            </p:stCondLst>
-                            <p:childTnLst>
-                              <p:par>
-                                <p:cTn id="15" presetID="1" presetClass="entr" presetSubtype="0" fill="hold" grpId="0" nodeType="clickEffect">
-                                  <p:stCondLst>
-                                    <p:cond delay="0"/>
-                                  </p:stCondLst>
-                                  <p:childTnLst>
-                                    <p:set>
-                                      <p:cBhvr>
-                                        <p:cTn id="16" dur="1" fill="hold">
-                                          <p:stCondLst>
-                                            <p:cond delay="0"/>
-                                          </p:stCondLst>
-                                        </p:cTn>
-                                        <p:tgtEl>
-                                          <p:spTgt spid="15"/>
-                                        </p:tgtEl>
-                                        <p:attrNameLst>
-                                          <p:attrName>style.visibility</p:attrName>
-                                        </p:attrNameLst>
-                                      </p:cBhvr>
-                                      <p:to>
-                                        <p:strVal val="visible"/>
-                                      </p:to>
-                                    </p:set>
-                                  </p:childTnLst>
-                                </p:cTn>
-                              </p:par>
-                              <p:par>
-                                <p:cTn id="17" presetID="1" presetClass="entr" presetSubtype="0" fill="hold" grpId="0" nodeType="withEffect">
-                                  <p:stCondLst>
-                                    <p:cond delay="0"/>
-                                  </p:stCondLst>
-                                  <p:childTnLst>
-                                    <p:set>
-                                      <p:cBhvr>
-                                        <p:cTn id="18" dur="1" fill="hold">
-                                          <p:stCondLst>
-                                            <p:cond delay="0"/>
-                                          </p:stCondLst>
-                                        </p:cTn>
-                                        <p:tgtEl>
-                                          <p:spTgt spid="16"/>
-                                        </p:tgtEl>
-                                        <p:attrNameLst>
-                                          <p:attrName>style.visibility</p:attrName>
-                                        </p:attrNameLst>
-                                      </p:cBhvr>
-                                      <p:to>
-                                        <p:strVal val="visible"/>
-                                      </p:to>
-                                    </p:set>
-                                  </p:childTnLst>
-                                </p:cTn>
-                              </p:par>
-                            </p:childTnLst>
-                          </p:cTn>
-                        </p:par>
-                      </p:childTnLst>
-                    </p:cTn>
-                  </p:par>
-                </p:childTnLst>
-              </p:cTn>
-              <p:prevCondLst>
-                <p:cond evt="onPrev" delay="0">
-                  <p:tgtEl>
-                    <p:sldTgt/>
-                  </p:tgtEl>
-                </p:cond>
-              </p:prevCondLst>
-              <p:nextCondLst>
-                <p:cond evt="onNext" delay="0">
-                  <p:tgtEl>
-                    <p:sldTgt/>
-                  </p:tgtEl>
-                </p:cond>
-              </p:nextCondLst>
-            </p:seq>
-          </p:childTnLst>
-        </p:cTn>
+        <p:cTn id="1" dur="indefinite" restart="never" nodeType="tmRoot"/>
       </p:par>
     </p:tnLst>
-    <p:bldLst>
-      <p:bldP spid="8" grpId="0" animBg="1"/>
-      <p:bldP spid="9" grpId="0" animBg="1"/>
-      <p:bldP spid="14" grpId="0" animBg="1"/>
-      <p:bldP spid="15" grpId="0" animBg="1"/>
-      <p:bldP spid="16" grpId="0" animBg="1"/>
-    </p:bldLst>
   </p:timing>
 </p:sld>
 </file>
@@ -7776,11 +7414,7 @@
             <a:pPr algn="ctr"/>
             <a:r>
               <a:rPr lang="en-US" altLang="zh-CN" dirty="0" err="1" smtClean="0"/>
-              <a:t>r</a:t>
-            </a:r>
-            <a:r>
-              <a:rPr lang="en-US" altLang="zh-CN" dirty="0" err="1" smtClean="0"/>
-              <a:t>oomUserNotificationResponce</a:t>
+              <a:t>roomUserNotificationResponce</a:t>
             </a:r>
             <a:endParaRPr lang="en-US" altLang="zh-CN" dirty="0" smtClean="0"/>
           </a:p>
@@ -7891,200 +7525,9 @@
   <p:timing>
     <p:tnLst>
       <p:par>
-        <p:cTn id="1" dur="indefinite" restart="never" nodeType="tmRoot">
-          <p:childTnLst>
-            <p:seq concurrent="1" nextAc="seek">
-              <p:cTn id="2" dur="indefinite" nodeType="mainSeq">
-                <p:childTnLst>
-                  <p:par>
-                    <p:cTn id="3" fill="hold">
-                      <p:stCondLst>
-                        <p:cond delay="indefinite"/>
-                      </p:stCondLst>
-                      <p:childTnLst>
-                        <p:par>
-                          <p:cTn id="4" fill="hold">
-                            <p:stCondLst>
-                              <p:cond delay="0"/>
-                            </p:stCondLst>
-                            <p:childTnLst>
-                              <p:par>
-                                <p:cTn id="5" presetID="1" presetClass="entr" presetSubtype="0" fill="hold" grpId="0" nodeType="clickEffect">
-                                  <p:stCondLst>
-                                    <p:cond delay="0"/>
-                                  </p:stCondLst>
-                                  <p:childTnLst>
-                                    <p:set>
-                                      <p:cBhvr>
-                                        <p:cTn id="6" dur="1" fill="hold">
-                                          <p:stCondLst>
-                                            <p:cond delay="0"/>
-                                          </p:stCondLst>
-                                        </p:cTn>
-                                        <p:tgtEl>
-                                          <p:spTgt spid="8"/>
-                                        </p:tgtEl>
-                                        <p:attrNameLst>
-                                          <p:attrName>style.visibility</p:attrName>
-                                        </p:attrNameLst>
-                                      </p:cBhvr>
-                                      <p:to>
-                                        <p:strVal val="visible"/>
-                                      </p:to>
-                                    </p:set>
-                                  </p:childTnLst>
-                                </p:cTn>
-                              </p:par>
-                            </p:childTnLst>
-                          </p:cTn>
-                        </p:par>
-                      </p:childTnLst>
-                    </p:cTn>
-                  </p:par>
-                  <p:par>
-                    <p:cTn id="7" fill="hold">
-                      <p:stCondLst>
-                        <p:cond delay="indefinite"/>
-                      </p:stCondLst>
-                      <p:childTnLst>
-                        <p:par>
-                          <p:cTn id="8" fill="hold">
-                            <p:stCondLst>
-                              <p:cond delay="0"/>
-                            </p:stCondLst>
-                            <p:childTnLst>
-                              <p:par>
-                                <p:cTn id="9" presetID="1" presetClass="entr" presetSubtype="0" fill="hold" grpId="0" nodeType="clickEffect">
-                                  <p:stCondLst>
-                                    <p:cond delay="0"/>
-                                  </p:stCondLst>
-                                  <p:childTnLst>
-                                    <p:set>
-                                      <p:cBhvr>
-                                        <p:cTn id="10" dur="1" fill="hold">
-                                          <p:stCondLst>
-                                            <p:cond delay="0"/>
-                                          </p:stCondLst>
-                                        </p:cTn>
-                                        <p:tgtEl>
-                                          <p:spTgt spid="7"/>
-                                        </p:tgtEl>
-                                        <p:attrNameLst>
-                                          <p:attrName>style.visibility</p:attrName>
-                                        </p:attrNameLst>
-                                      </p:cBhvr>
-                                      <p:to>
-                                        <p:strVal val="visible"/>
-                                      </p:to>
-                                    </p:set>
-                                  </p:childTnLst>
-                                </p:cTn>
-                              </p:par>
-                            </p:childTnLst>
-                          </p:cTn>
-                        </p:par>
-                      </p:childTnLst>
-                    </p:cTn>
-                  </p:par>
-                  <p:par>
-                    <p:cTn id="11" fill="hold">
-                      <p:stCondLst>
-                        <p:cond delay="indefinite"/>
-                      </p:stCondLst>
-                      <p:childTnLst>
-                        <p:par>
-                          <p:cTn id="12" fill="hold">
-                            <p:stCondLst>
-                              <p:cond delay="0"/>
-                            </p:stCondLst>
-                            <p:childTnLst>
-                              <p:par>
-                                <p:cTn id="13" presetID="1" presetClass="entr" presetSubtype="0" fill="hold" grpId="0" nodeType="clickEffect">
-                                  <p:stCondLst>
-                                    <p:cond delay="0"/>
-                                  </p:stCondLst>
-                                  <p:childTnLst>
-                                    <p:set>
-                                      <p:cBhvr>
-                                        <p:cTn id="14" dur="1" fill="hold">
-                                          <p:stCondLst>
-                                            <p:cond delay="0"/>
-                                          </p:stCondLst>
-                                        </p:cTn>
-                                        <p:tgtEl>
-                                          <p:spTgt spid="14"/>
-                                        </p:tgtEl>
-                                        <p:attrNameLst>
-                                          <p:attrName>style.visibility</p:attrName>
-                                        </p:attrNameLst>
-                                      </p:cBhvr>
-                                      <p:to>
-                                        <p:strVal val="visible"/>
-                                      </p:to>
-                                    </p:set>
-                                  </p:childTnLst>
-                                </p:cTn>
-                              </p:par>
-                              <p:par>
-                                <p:cTn id="15" presetID="1" presetClass="entr" presetSubtype="0" fill="hold" grpId="0" nodeType="withEffect">
-                                  <p:stCondLst>
-                                    <p:cond delay="0"/>
-                                  </p:stCondLst>
-                                  <p:childTnLst>
-                                    <p:set>
-                                      <p:cBhvr>
-                                        <p:cTn id="16" dur="1" fill="hold">
-                                          <p:stCondLst>
-                                            <p:cond delay="0"/>
-                                          </p:stCondLst>
-                                        </p:cTn>
-                                        <p:tgtEl>
-                                          <p:spTgt spid="15"/>
-                                        </p:tgtEl>
-                                        <p:attrNameLst>
-                                          <p:attrName>style.visibility</p:attrName>
-                                        </p:attrNameLst>
-                                      </p:cBhvr>
-                                      <p:to>
-                                        <p:strVal val="visible"/>
-                                      </p:to>
-                                    </p:set>
-                                  </p:childTnLst>
-                                </p:cTn>
-                              </p:par>
-                            </p:childTnLst>
-                          </p:cTn>
-                        </p:par>
-                      </p:childTnLst>
-                    </p:cTn>
-                  </p:par>
-                </p:childTnLst>
-              </p:cTn>
-              <p:prevCondLst>
-                <p:cond evt="onPrev" delay="0">
-                  <p:tgtEl>
-                    <p:sldTgt/>
-                  </p:tgtEl>
-                </p:cond>
-              </p:prevCondLst>
-              <p:nextCondLst>
-                <p:cond evt="onNext" delay="0">
-                  <p:tgtEl>
-                    <p:sldTgt/>
-                  </p:tgtEl>
-                </p:cond>
-              </p:nextCondLst>
-            </p:seq>
-          </p:childTnLst>
-        </p:cTn>
+        <p:cTn id="1" dur="indefinite" restart="never" nodeType="tmRoot"/>
       </p:par>
     </p:tnLst>
-    <p:bldLst>
-      <p:bldP spid="7" grpId="0" animBg="1"/>
-      <p:bldP spid="8" grpId="0" animBg="1"/>
-      <p:bldP spid="14" grpId="0" animBg="1"/>
-      <p:bldP spid="15" grpId="0" animBg="1"/>
-    </p:bldLst>
   </p:timing>
 </p:sld>
 </file>
@@ -8249,7 +7692,6 @@
               <a:rPr lang="en-US" altLang="zh-CN" dirty="0" smtClean="0"/>
               <a:t>message</a:t>
             </a:r>
-            <a:endParaRPr lang="en-US" altLang="zh-CN" dirty="0" smtClean="0"/>
           </a:p>
         </p:txBody>
       </p:sp>
@@ -8493,7 +7935,6 @@
               <a:rPr lang="en-US" altLang="zh-CN" dirty="0" smtClean="0"/>
               <a:t>owner</a:t>
             </a:r>
-            <a:endParaRPr lang="en-US" altLang="zh-CN" dirty="0" smtClean="0"/>
           </a:p>
           <a:p>
             <a:pPr algn="ctr"/>
@@ -9091,228 +8532,9 @@
   <p:timing>
     <p:tnLst>
       <p:par>
-        <p:cTn id="1" dur="indefinite" restart="never" nodeType="tmRoot">
-          <p:childTnLst>
-            <p:seq concurrent="1" nextAc="seek">
-              <p:cTn id="2" dur="indefinite" nodeType="mainSeq">
-                <p:childTnLst>
-                  <p:par>
-                    <p:cTn id="3" fill="hold">
-                      <p:stCondLst>
-                        <p:cond delay="indefinite"/>
-                      </p:stCondLst>
-                      <p:childTnLst>
-                        <p:par>
-                          <p:cTn id="4" fill="hold">
-                            <p:stCondLst>
-                              <p:cond delay="0"/>
-                            </p:stCondLst>
-                            <p:childTnLst>
-                              <p:par>
-                                <p:cTn id="5" presetID="1" presetClass="entr" presetSubtype="0" fill="hold" grpId="0" nodeType="clickEffect">
-                                  <p:stCondLst>
-                                    <p:cond delay="0"/>
-                                  </p:stCondLst>
-                                  <p:childTnLst>
-                                    <p:set>
-                                      <p:cBhvr>
-                                        <p:cTn id="6" dur="1" fill="hold">
-                                          <p:stCondLst>
-                                            <p:cond delay="0"/>
-                                          </p:stCondLst>
-                                        </p:cTn>
-                                        <p:tgtEl>
-                                          <p:spTgt spid="9"/>
-                                        </p:tgtEl>
-                                        <p:attrNameLst>
-                                          <p:attrName>style.visibility</p:attrName>
-                                        </p:attrNameLst>
-                                      </p:cBhvr>
-                                      <p:to>
-                                        <p:strVal val="visible"/>
-                                      </p:to>
-                                    </p:set>
-                                  </p:childTnLst>
-                                </p:cTn>
-                              </p:par>
-                            </p:childTnLst>
-                          </p:cTn>
-                        </p:par>
-                      </p:childTnLst>
-                    </p:cTn>
-                  </p:par>
-                  <p:par>
-                    <p:cTn id="7" fill="hold">
-                      <p:stCondLst>
-                        <p:cond delay="indefinite"/>
-                      </p:stCondLst>
-                      <p:childTnLst>
-                        <p:par>
-                          <p:cTn id="8" fill="hold">
-                            <p:stCondLst>
-                              <p:cond delay="0"/>
-                            </p:stCondLst>
-                            <p:childTnLst>
-                              <p:par>
-                                <p:cTn id="9" presetID="1" presetClass="entr" presetSubtype="0" fill="hold" grpId="0" nodeType="clickEffect">
-                                  <p:stCondLst>
-                                    <p:cond delay="0"/>
-                                  </p:stCondLst>
-                                  <p:childTnLst>
-                                    <p:set>
-                                      <p:cBhvr>
-                                        <p:cTn id="10" dur="1" fill="hold">
-                                          <p:stCondLst>
-                                            <p:cond delay="0"/>
-                                          </p:stCondLst>
-                                        </p:cTn>
-                                        <p:tgtEl>
-                                          <p:spTgt spid="8"/>
-                                        </p:tgtEl>
-                                        <p:attrNameLst>
-                                          <p:attrName>style.visibility</p:attrName>
-                                        </p:attrNameLst>
-                                      </p:cBhvr>
-                                      <p:to>
-                                        <p:strVal val="visible"/>
-                                      </p:to>
-                                    </p:set>
-                                  </p:childTnLst>
-                                </p:cTn>
-                              </p:par>
-                            </p:childTnLst>
-                          </p:cTn>
-                        </p:par>
-                      </p:childTnLst>
-                    </p:cTn>
-                  </p:par>
-                  <p:par>
-                    <p:cTn id="11" fill="hold">
-                      <p:stCondLst>
-                        <p:cond delay="indefinite"/>
-                      </p:stCondLst>
-                      <p:childTnLst>
-                        <p:par>
-                          <p:cTn id="12" fill="hold">
-                            <p:stCondLst>
-                              <p:cond delay="0"/>
-                            </p:stCondLst>
-                            <p:childTnLst>
-                              <p:par>
-                                <p:cTn id="13" presetID="1" presetClass="entr" presetSubtype="0" fill="hold" grpId="0" nodeType="clickEffect">
-                                  <p:stCondLst>
-                                    <p:cond delay="0"/>
-                                  </p:stCondLst>
-                                  <p:childTnLst>
-                                    <p:set>
-                                      <p:cBhvr>
-                                        <p:cTn id="14" dur="1" fill="hold">
-                                          <p:stCondLst>
-                                            <p:cond delay="0"/>
-                                          </p:stCondLst>
-                                        </p:cTn>
-                                        <p:tgtEl>
-                                          <p:spTgt spid="15"/>
-                                        </p:tgtEl>
-                                        <p:attrNameLst>
-                                          <p:attrName>style.visibility</p:attrName>
-                                        </p:attrNameLst>
-                                      </p:cBhvr>
-                                      <p:to>
-                                        <p:strVal val="visible"/>
-                                      </p:to>
-                                    </p:set>
-                                  </p:childTnLst>
-                                </p:cTn>
-                              </p:par>
-                              <p:par>
-                                <p:cTn id="15" presetID="1" presetClass="entr" presetSubtype="0" fill="hold" grpId="0" nodeType="withEffect">
-                                  <p:stCondLst>
-                                    <p:cond delay="0"/>
-                                  </p:stCondLst>
-                                  <p:childTnLst>
-                                    <p:set>
-                                      <p:cBhvr>
-                                        <p:cTn id="16" dur="1" fill="hold">
-                                          <p:stCondLst>
-                                            <p:cond delay="0"/>
-                                          </p:stCondLst>
-                                        </p:cTn>
-                                        <p:tgtEl>
-                                          <p:spTgt spid="16"/>
-                                        </p:tgtEl>
-                                        <p:attrNameLst>
-                                          <p:attrName>style.visibility</p:attrName>
-                                        </p:attrNameLst>
-                                      </p:cBhvr>
-                                      <p:to>
-                                        <p:strVal val="visible"/>
-                                      </p:to>
-                                    </p:set>
-                                  </p:childTnLst>
-                                </p:cTn>
-                              </p:par>
-                              <p:par>
-                                <p:cTn id="17" presetID="1" presetClass="entr" presetSubtype="0" fill="hold" grpId="0" nodeType="withEffect">
-                                  <p:stCondLst>
-                                    <p:cond delay="0"/>
-                                  </p:stCondLst>
-                                  <p:childTnLst>
-                                    <p:set>
-                                      <p:cBhvr>
-                                        <p:cTn id="18" dur="1" fill="hold">
-                                          <p:stCondLst>
-                                            <p:cond delay="0"/>
-                                          </p:stCondLst>
-                                        </p:cTn>
-                                        <p:tgtEl>
-                                          <p:spTgt spid="18"/>
-                                        </p:tgtEl>
-                                        <p:attrNameLst>
-                                          <p:attrName>style.visibility</p:attrName>
-                                        </p:attrNameLst>
-                                      </p:cBhvr>
-                                      <p:to>
-                                        <p:strVal val="visible"/>
-                                      </p:to>
-                                    </p:set>
-                                  </p:childTnLst>
-                                </p:cTn>
-                              </p:par>
-                            </p:childTnLst>
-                          </p:cTn>
-                        </p:par>
-                      </p:childTnLst>
-                    </p:cTn>
-                  </p:par>
-                </p:childTnLst>
-              </p:cTn>
-              <p:prevCondLst>
-                <p:cond evt="onPrev" delay="0">
-                  <p:tgtEl>
-                    <p:sldTgt/>
-                  </p:tgtEl>
-                </p:cond>
-              </p:prevCondLst>
-              <p:nextCondLst>
-                <p:cond evt="onNext" delay="0">
-                  <p:tgtEl>
-                    <p:sldTgt/>
-                  </p:tgtEl>
-                </p:cond>
-              </p:nextCondLst>
-            </p:seq>
-          </p:childTnLst>
-        </p:cTn>
+        <p:cTn id="1" dur="indefinite" restart="never" nodeType="tmRoot"/>
       </p:par>
     </p:tnLst>
-    <p:bldLst>
-      <p:bldP spid="8" grpId="0" animBg="1"/>
-      <p:bldP spid="9" grpId="0" animBg="1"/>
-      <p:bldP spid="15" grpId="0" animBg="1"/>
-      <p:bldP spid="16" grpId="0" animBg="1"/>
-      <p:bldP spid="18" grpId="0" animBg="1"/>
-    </p:bldLst>
   </p:timing>
 </p:sld>
 </file>
@@ -10000,7 +9222,6 @@
               <a:rPr lang="en-US" altLang="zh-CN" dirty="0" smtClean="0"/>
               <a:t>sender</a:t>
             </a:r>
-            <a:endParaRPr lang="en-US" altLang="zh-CN" dirty="0" smtClean="0"/>
           </a:p>
         </p:txBody>
       </p:sp>
@@ -10181,228 +9402,9 @@
   <p:timing>
     <p:tnLst>
       <p:par>
-        <p:cTn id="1" dur="indefinite" restart="never" nodeType="tmRoot">
-          <p:childTnLst>
-            <p:seq concurrent="1" nextAc="seek">
-              <p:cTn id="2" dur="indefinite" nodeType="mainSeq">
-                <p:childTnLst>
-                  <p:par>
-                    <p:cTn id="3" fill="hold">
-                      <p:stCondLst>
-                        <p:cond delay="indefinite"/>
-                      </p:stCondLst>
-                      <p:childTnLst>
-                        <p:par>
-                          <p:cTn id="4" fill="hold">
-                            <p:stCondLst>
-                              <p:cond delay="0"/>
-                            </p:stCondLst>
-                            <p:childTnLst>
-                              <p:par>
-                                <p:cTn id="5" presetID="1" presetClass="entr" presetSubtype="0" fill="hold" grpId="0" nodeType="clickEffect">
-                                  <p:stCondLst>
-                                    <p:cond delay="0"/>
-                                  </p:stCondLst>
-                                  <p:childTnLst>
-                                    <p:set>
-                                      <p:cBhvr>
-                                        <p:cTn id="6" dur="1" fill="hold">
-                                          <p:stCondLst>
-                                            <p:cond delay="0"/>
-                                          </p:stCondLst>
-                                        </p:cTn>
-                                        <p:tgtEl>
-                                          <p:spTgt spid="8"/>
-                                        </p:tgtEl>
-                                        <p:attrNameLst>
-                                          <p:attrName>style.visibility</p:attrName>
-                                        </p:attrNameLst>
-                                      </p:cBhvr>
-                                      <p:to>
-                                        <p:strVal val="visible"/>
-                                      </p:to>
-                                    </p:set>
-                                  </p:childTnLst>
-                                </p:cTn>
-                              </p:par>
-                              <p:par>
-                                <p:cTn id="7" presetID="1" presetClass="entr" presetSubtype="0" fill="hold" grpId="0" nodeType="withEffect">
-                                  <p:stCondLst>
-                                    <p:cond delay="0"/>
-                                  </p:stCondLst>
-                                  <p:childTnLst>
-                                    <p:set>
-                                      <p:cBhvr>
-                                        <p:cTn id="8" dur="1" fill="hold">
-                                          <p:stCondLst>
-                                            <p:cond delay="0"/>
-                                          </p:stCondLst>
-                                        </p:cTn>
-                                        <p:tgtEl>
-                                          <p:spTgt spid="11"/>
-                                        </p:tgtEl>
-                                        <p:attrNameLst>
-                                          <p:attrName>style.visibility</p:attrName>
-                                        </p:attrNameLst>
-                                      </p:cBhvr>
-                                      <p:to>
-                                        <p:strVal val="visible"/>
-                                      </p:to>
-                                    </p:set>
-                                  </p:childTnLst>
-                                </p:cTn>
-                              </p:par>
-                            </p:childTnLst>
-                          </p:cTn>
-                        </p:par>
-                      </p:childTnLst>
-                    </p:cTn>
-                  </p:par>
-                  <p:par>
-                    <p:cTn id="9" fill="hold">
-                      <p:stCondLst>
-                        <p:cond delay="indefinite"/>
-                      </p:stCondLst>
-                      <p:childTnLst>
-                        <p:par>
-                          <p:cTn id="10" fill="hold">
-                            <p:stCondLst>
-                              <p:cond delay="0"/>
-                            </p:stCondLst>
-                            <p:childTnLst>
-                              <p:par>
-                                <p:cTn id="11" presetID="1" presetClass="entr" presetSubtype="0" fill="hold" grpId="0" nodeType="clickEffect">
-                                  <p:stCondLst>
-                                    <p:cond delay="0"/>
-                                  </p:stCondLst>
-                                  <p:childTnLst>
-                                    <p:set>
-                                      <p:cBhvr>
-                                        <p:cTn id="12" dur="1" fill="hold">
-                                          <p:stCondLst>
-                                            <p:cond delay="0"/>
-                                          </p:stCondLst>
-                                        </p:cTn>
-                                        <p:tgtEl>
-                                          <p:spTgt spid="7"/>
-                                        </p:tgtEl>
-                                        <p:attrNameLst>
-                                          <p:attrName>style.visibility</p:attrName>
-                                        </p:attrNameLst>
-                                      </p:cBhvr>
-                                      <p:to>
-                                        <p:strVal val="visible"/>
-                                      </p:to>
-                                    </p:set>
-                                  </p:childTnLst>
-                                </p:cTn>
-                              </p:par>
-                            </p:childTnLst>
-                          </p:cTn>
-                        </p:par>
-                      </p:childTnLst>
-                    </p:cTn>
-                  </p:par>
-                  <p:par>
-                    <p:cTn id="13" fill="hold">
-                      <p:stCondLst>
-                        <p:cond delay="indefinite"/>
-                      </p:stCondLst>
-                      <p:childTnLst>
-                        <p:par>
-                          <p:cTn id="14" fill="hold">
-                            <p:stCondLst>
-                              <p:cond delay="0"/>
-                            </p:stCondLst>
-                            <p:childTnLst>
-                              <p:par>
-                                <p:cTn id="15" presetID="1" presetClass="entr" presetSubtype="0" fill="hold" grpId="0" nodeType="clickEffect">
-                                  <p:stCondLst>
-                                    <p:cond delay="0"/>
-                                  </p:stCondLst>
-                                  <p:childTnLst>
-                                    <p:set>
-                                      <p:cBhvr>
-                                        <p:cTn id="16" dur="1" fill="hold">
-                                          <p:stCondLst>
-                                            <p:cond delay="0"/>
-                                          </p:stCondLst>
-                                        </p:cTn>
-                                        <p:tgtEl>
-                                          <p:spTgt spid="12"/>
-                                        </p:tgtEl>
-                                        <p:attrNameLst>
-                                          <p:attrName>style.visibility</p:attrName>
-                                        </p:attrNameLst>
-                                      </p:cBhvr>
-                                      <p:to>
-                                        <p:strVal val="visible"/>
-                                      </p:to>
-                                    </p:set>
-                                  </p:childTnLst>
-                                </p:cTn>
-                              </p:par>
-                              <p:par>
-                                <p:cTn id="17" presetID="1" presetClass="entr" presetSubtype="0" fill="hold" grpId="0" nodeType="withEffect">
-                                  <p:stCondLst>
-                                    <p:cond delay="0"/>
-                                  </p:stCondLst>
-                                  <p:childTnLst>
-                                    <p:set>
-                                      <p:cBhvr>
-                                        <p:cTn id="18" dur="1" fill="hold">
-                                          <p:stCondLst>
-                                            <p:cond delay="0"/>
-                                          </p:stCondLst>
-                                        </p:cTn>
-                                        <p:tgtEl>
-                                          <p:spTgt spid="13"/>
-                                        </p:tgtEl>
-                                        <p:attrNameLst>
-                                          <p:attrName>style.visibility</p:attrName>
-                                        </p:attrNameLst>
-                                      </p:cBhvr>
-                                      <p:to>
-                                        <p:strVal val="visible"/>
-                                      </p:to>
-                                    </p:set>
-                                  </p:childTnLst>
-                                </p:cTn>
-                              </p:par>
-                            </p:childTnLst>
-                          </p:cTn>
-                        </p:par>
-                      </p:childTnLst>
-                    </p:cTn>
-                  </p:par>
-                </p:childTnLst>
-              </p:cTn>
-              <p:prevCondLst>
-                <p:cond evt="onPrev" delay="0">
-                  <p:tgtEl>
-                    <p:sldTgt/>
-                  </p:tgtEl>
-                </p:cond>
-              </p:prevCondLst>
-              <p:nextCondLst>
-                <p:cond evt="onNext" delay="0">
-                  <p:tgtEl>
-                    <p:sldTgt/>
-                  </p:tgtEl>
-                </p:cond>
-              </p:nextCondLst>
-            </p:seq>
-          </p:childTnLst>
-        </p:cTn>
+        <p:cTn id="1" dur="indefinite" restart="never" nodeType="tmRoot"/>
       </p:par>
     </p:tnLst>
-    <p:bldLst>
-      <p:bldP spid="7" grpId="0" animBg="1"/>
-      <p:bldP spid="8" grpId="0" animBg="1"/>
-      <p:bldP spid="11" grpId="0" animBg="1"/>
-      <p:bldP spid="12" grpId="0" animBg="1"/>
-      <p:bldP spid="13" grpId="0" animBg="1"/>
-    </p:bldLst>
   </p:timing>
 </p:sld>
 </file>

</xml_diff>

<commit_message>
modify design decision slide
</commit_message>
<xml_diff>
--- a/src/main/resources/final_CA_slides.pptx
+++ b/src/main/resources/final_CA_slides.pptx
@@ -119,7 +119,7 @@
   </p:defaultTextStyle>
   <p:extLst>
     <p:ext uri="{EFAFB233-063F-42B5-8137-9DF3F51BA10A}">
-      <p15:sldGuideLst xmlns:p15="http://schemas.microsoft.com/office/powerpoint/2012/main">
+      <p15:sldGuideLst xmlns:p15="http://schemas.microsoft.com/office/powerpoint/2012/main" xmlns="">
         <p15:guide id="1" orient="horz" pos="2160">
           <p15:clr>
             <a:srgbClr val="A4A3A4"/>
@@ -4538,7 +4538,7 @@
   <p:timing>
     <p:tnLst>
       <p:par>
-        <p:cTn id="1" dur="indefinite" restart="never" nodeType="tmRoot"/>
+        <p:cTn xmlns:p14="http://schemas.microsoft.com/office/powerpoint/2010/main" id="1" dur="indefinite" restart="never" nodeType="tmRoot"/>
       </p:par>
     </p:tnLst>
   </p:timing>
@@ -4660,8 +4660,8 @@
           </a:p>
           <a:p>
             <a:r>
-              <a:rPr lang="en-US" altLang="zh-CN" dirty="0" smtClean="0"/>
-              <a:t>Received</a:t>
+              <a:rPr lang="en-US" altLang="zh-CN" smtClean="0"/>
+              <a:t>Received (read)</a:t>
             </a:r>
             <a:r>
               <a:rPr lang="zh-CN" altLang="en-US" dirty="0" smtClean="0"/>
@@ -4845,7 +4845,7 @@
   <p:timing>
     <p:tnLst>
       <p:par>
-        <p:cTn id="1" dur="indefinite" restart="never" nodeType="tmRoot"/>
+        <p:cTn xmlns:p14="http://schemas.microsoft.com/office/powerpoint/2010/main" id="1" dur="indefinite" restart="never" nodeType="tmRoot"/>
       </p:par>
     </p:tnLst>
   </p:timing>
@@ -4910,7 +4910,7 @@
   <p:timing>
     <p:tnLst>
       <p:par>
-        <p:cTn id="1" dur="indefinite" restart="never" nodeType="tmRoot"/>
+        <p:cTn xmlns:p14="http://schemas.microsoft.com/office/powerpoint/2010/main" id="1" dur="indefinite" restart="never" nodeType="tmRoot"/>
       </p:par>
     </p:tnLst>
   </p:timing>
@@ -5008,7 +5008,7 @@
   <p:timing>
     <p:tnLst>
       <p:par>
-        <p:cTn id="1" dur="indefinite" restart="never" nodeType="tmRoot"/>
+        <p:cTn xmlns:p14="http://schemas.microsoft.com/office/powerpoint/2010/main" id="1" dur="indefinite" restart="never" nodeType="tmRoot"/>
       </p:par>
     </p:tnLst>
   </p:timing>
@@ -5106,7 +5106,7 @@
   <p:timing>
     <p:tnLst>
       <p:par>
-        <p:cTn id="1" dur="indefinite" restart="never" nodeType="tmRoot"/>
+        <p:cTn xmlns:p14="http://schemas.microsoft.com/office/powerpoint/2010/main" id="1" dur="indefinite" restart="never" nodeType="tmRoot"/>
       </p:par>
     </p:tnLst>
   </p:timing>
@@ -5173,7 +5173,7 @@
   <p:timing>
     <p:tnLst>
       <p:par>
-        <p:cTn id="1" dur="indefinite" restart="never" nodeType="tmRoot"/>
+        <p:cTn xmlns:p14="http://schemas.microsoft.com/office/powerpoint/2010/main" id="1" dur="indefinite" restart="never" nodeType="tmRoot"/>
       </p:par>
     </p:tnLst>
   </p:timing>
@@ -5949,7 +5949,7 @@
   <p:timing>
     <p:tnLst>
       <p:par>
-        <p:cTn id="1" dur="indefinite" restart="never" nodeType="tmRoot"/>
+        <p:cTn xmlns:p14="http://schemas.microsoft.com/office/powerpoint/2010/main" id="1" dur="indefinite" restart="never" nodeType="tmRoot"/>
       </p:par>
     </p:tnLst>
   </p:timing>
@@ -6744,7 +6744,7 @@
   <p:timing>
     <p:tnLst>
       <p:par>
-        <p:cTn id="1" dur="indefinite" restart="never" nodeType="tmRoot"/>
+        <p:cTn xmlns:p14="http://schemas.microsoft.com/office/powerpoint/2010/main" id="1" dur="indefinite" restart="never" nodeType="tmRoot"/>
       </p:par>
     </p:tnLst>
   </p:timing>
@@ -7525,7 +7525,7 @@
   <p:timing>
     <p:tnLst>
       <p:par>
-        <p:cTn id="1" dur="indefinite" restart="never" nodeType="tmRoot"/>
+        <p:cTn xmlns:p14="http://schemas.microsoft.com/office/powerpoint/2010/main" id="1" dur="indefinite" restart="never" nodeType="tmRoot"/>
       </p:par>
     </p:tnLst>
   </p:timing>
@@ -8532,7 +8532,7 @@
   <p:timing>
     <p:tnLst>
       <p:par>
-        <p:cTn id="1" dur="indefinite" restart="never" nodeType="tmRoot"/>
+        <p:cTn xmlns:p14="http://schemas.microsoft.com/office/powerpoint/2010/main" id="1" dur="indefinite" restart="never" nodeType="tmRoot"/>
       </p:par>
     </p:tnLst>
   </p:timing>
@@ -9402,7 +9402,7 @@
   <p:timing>
     <p:tnLst>
       <p:par>
-        <p:cTn id="1" dur="indefinite" restart="never" nodeType="tmRoot"/>
+        <p:cTn xmlns:p14="http://schemas.microsoft.com/office/powerpoint/2010/main" id="1" dur="indefinite" restart="never" nodeType="tmRoot"/>
       </p:par>
     </p:tnLst>
   </p:timing>

</xml_diff>